<commit_message>
Atalho de erro adicionado
</commit_message>
<xml_diff>
--- a/Introdução ao desenvolvimento Android.pptx
+++ b/Introdução ao desenvolvimento Android.pptx
@@ -844,7 +844,7 @@
             <a:fld id="{B61BEF0D-F0BB-DE4B-95CE-6DB70DBA9567}" type="datetimeFigureOut">
               <a:rPr lang="en-US" dirty="0"/>
               <a:pPr/>
-              <a:t>18/10/2015</a:t>
+              <a:t>20/10/2015</a:t>
             </a:fld>
             <a:endParaRPr lang="en-US" dirty="0"/>
           </a:p>
@@ -1095,7 +1095,7 @@
             <a:fld id="{B61BEF0D-F0BB-DE4B-95CE-6DB70DBA9567}" type="datetimeFigureOut">
               <a:rPr lang="en-US" dirty="0"/>
               <a:pPr/>
-              <a:t>18/10/2015</a:t>
+              <a:t>20/10/2015</a:t>
             </a:fld>
             <a:endParaRPr lang="en-US" dirty="0"/>
           </a:p>
@@ -1409,7 +1409,7 @@
             <a:fld id="{B61BEF0D-F0BB-DE4B-95CE-6DB70DBA9567}" type="datetimeFigureOut">
               <a:rPr lang="en-US" dirty="0"/>
               <a:pPr/>
-              <a:t>18/10/2015</a:t>
+              <a:t>20/10/2015</a:t>
             </a:fld>
             <a:endParaRPr lang="en-US" dirty="0"/>
           </a:p>
@@ -1750,7 +1750,7 @@
             <a:fld id="{B61BEF0D-F0BB-DE4B-95CE-6DB70DBA9567}" type="datetimeFigureOut">
               <a:rPr lang="en-US" dirty="0"/>
               <a:pPr/>
-              <a:t>18/10/2015</a:t>
+              <a:t>20/10/2015</a:t>
             </a:fld>
             <a:endParaRPr lang="en-US" dirty="0"/>
           </a:p>
@@ -2064,7 +2064,7 @@
             <a:fld id="{B61BEF0D-F0BB-DE4B-95CE-6DB70DBA9567}" type="datetimeFigureOut">
               <a:rPr lang="en-US" dirty="0"/>
               <a:pPr/>
-              <a:t>18/10/2015</a:t>
+              <a:t>20/10/2015</a:t>
             </a:fld>
             <a:endParaRPr lang="en-US" dirty="0"/>
           </a:p>
@@ -2457,7 +2457,7 @@
             <a:fld id="{B61BEF0D-F0BB-DE4B-95CE-6DB70DBA9567}" type="datetimeFigureOut">
               <a:rPr lang="en-US" dirty="0"/>
               <a:pPr/>
-              <a:t>18/10/2015</a:t>
+              <a:t>20/10/2015</a:t>
             </a:fld>
             <a:endParaRPr lang="en-US" dirty="0"/>
           </a:p>
@@ -2626,7 +2626,7 @@
           <a:p>
             <a:fld id="{55C6B4A9-1611-4792-9094-5F34BCA07E0B}" type="datetimeFigureOut">
               <a:rPr lang="en-US" dirty="0"/>
-              <a:t>18/10/2015</a:t>
+              <a:t>20/10/2015</a:t>
             </a:fld>
             <a:endParaRPr lang="en-US" dirty="0"/>
           </a:p>
@@ -2805,7 +2805,7 @@
             <a:fld id="{B61BEF0D-F0BB-DE4B-95CE-6DB70DBA9567}" type="datetimeFigureOut">
               <a:rPr lang="en-US" dirty="0"/>
               <a:pPr/>
-              <a:t>18/10/2015</a:t>
+              <a:t>20/10/2015</a:t>
             </a:fld>
             <a:endParaRPr lang="en-US" dirty="0"/>
           </a:p>
@@ -2981,7 +2981,7 @@
             <a:fld id="{B61BEF0D-F0BB-DE4B-95CE-6DB70DBA9567}" type="datetimeFigureOut">
               <a:rPr lang="en-US" dirty="0"/>
               <a:pPr/>
-              <a:t>18/10/2015</a:t>
+              <a:t>20/10/2015</a:t>
             </a:fld>
             <a:endParaRPr lang="en-US" dirty="0"/>
           </a:p>
@@ -3228,7 +3228,7 @@
             <a:fld id="{B61BEF0D-F0BB-DE4B-95CE-6DB70DBA9567}" type="datetimeFigureOut">
               <a:rPr lang="en-US" dirty="0"/>
               <a:pPr/>
-              <a:t>18/10/2015</a:t>
+              <a:t>20/10/2015</a:t>
             </a:fld>
             <a:endParaRPr lang="en-US" dirty="0"/>
           </a:p>
@@ -3459,7 +3459,7 @@
           <a:p>
             <a:fld id="{EB712588-04B1-427B-82EE-E8DB90309F08}" type="datetimeFigureOut">
               <a:rPr lang="en-US" dirty="0"/>
-              <a:t>18/10/2015</a:t>
+              <a:t>20/10/2015</a:t>
             </a:fld>
             <a:endParaRPr lang="en-US" dirty="0"/>
           </a:p>
@@ -3832,7 +3832,7 @@
             <a:fld id="{B61BEF0D-F0BB-DE4B-95CE-6DB70DBA9567}" type="datetimeFigureOut">
               <a:rPr lang="en-US" dirty="0"/>
               <a:pPr/>
-              <a:t>18/10/2015</a:t>
+              <a:t>20/10/2015</a:t>
             </a:fld>
             <a:endParaRPr lang="en-US" dirty="0"/>
           </a:p>
@@ -3955,7 +3955,7 @@
             <a:fld id="{B61BEF0D-F0BB-DE4B-95CE-6DB70DBA9567}" type="datetimeFigureOut">
               <a:rPr lang="en-US" dirty="0"/>
               <a:pPr/>
-              <a:t>18/10/2015</a:t>
+              <a:t>20/10/2015</a:t>
             </a:fld>
             <a:endParaRPr lang="en-US" dirty="0"/>
           </a:p>
@@ -4050,7 +4050,7 @@
             <a:fld id="{B61BEF0D-F0BB-DE4B-95CE-6DB70DBA9567}" type="datetimeFigureOut">
               <a:rPr lang="en-US" dirty="0"/>
               <a:pPr/>
-              <a:t>18/10/2015</a:t>
+              <a:t>20/10/2015</a:t>
             </a:fld>
             <a:endParaRPr lang="en-US" dirty="0"/>
           </a:p>
@@ -4304,7 +4304,7 @@
           <a:p>
             <a:fld id="{42A54C80-263E-416B-A8E0-580EDEADCBDC}" type="datetimeFigureOut">
               <a:rPr lang="en-US" dirty="0"/>
-              <a:t>18/10/2015</a:t>
+              <a:t>20/10/2015</a:t>
             </a:fld>
             <a:endParaRPr lang="en-US" dirty="0"/>
           </a:p>
@@ -4566,7 +4566,7 @@
             <a:fld id="{B61BEF0D-F0BB-DE4B-95CE-6DB70DBA9567}" type="datetimeFigureOut">
               <a:rPr lang="en-US" dirty="0"/>
               <a:pPr/>
-              <a:t>18/10/2015</a:t>
+              <a:t>20/10/2015</a:t>
             </a:fld>
             <a:endParaRPr lang="en-US" dirty="0"/>
           </a:p>
@@ -5309,7 +5309,7 @@
             <a:fld id="{B61BEF0D-F0BB-DE4B-95CE-6DB70DBA9567}" type="datetimeFigureOut">
               <a:rPr lang="en-US" dirty="0"/>
               <a:pPr/>
-              <a:t>18/10/2015</a:t>
+              <a:t>20/10/2015</a:t>
             </a:fld>
             <a:endParaRPr lang="en-US" dirty="0"/>
           </a:p>
@@ -6457,7 +6457,34 @@
             </a:r>
             <a:r>
               <a:rPr lang="pt-BR" dirty="0" smtClean="0"/>
-              <a:t> + P</a:t>
+              <a:t> + </a:t>
+            </a:r>
+            <a:r>
+              <a:rPr lang="pt-BR" dirty="0" smtClean="0"/>
+              <a:t>P</a:t>
+            </a:r>
+          </a:p>
+          <a:p>
+            <a:pPr lvl="1"/>
+            <a:r>
+              <a:rPr lang="pt-BR" dirty="0" smtClean="0"/>
+              <a:t>Sugestõe</a:t>
+            </a:r>
+            <a:r>
+              <a:rPr lang="pt-BR" dirty="0" smtClean="0"/>
+              <a:t>s de correção de erro: </a:t>
+            </a:r>
+            <a:r>
+              <a:rPr lang="pt-BR" dirty="0" err="1" smtClean="0"/>
+              <a:t>Alt</a:t>
+            </a:r>
+            <a:r>
+              <a:rPr lang="pt-BR" dirty="0" smtClean="0"/>
+              <a:t> + </a:t>
+            </a:r>
+            <a:r>
+              <a:rPr lang="pt-BR" dirty="0" err="1" smtClean="0"/>
+              <a:t>Enter</a:t>
             </a:r>
             <a:endParaRPr lang="en-US" dirty="0"/>
           </a:p>

</xml_diff>